<commit_message>
update presentation and add videos
</commit_message>
<xml_diff>
--- a/resources/presentation.pptx
+++ b/resources/presentation.pptx
@@ -307,7 +307,7 @@
           <a:p>
             <a:fld id="{E85117BD-C86A-4D3E-8433-2BCBAA5D5AFD}" type="datetimeFigureOut">
               <a:rPr lang="en-US" smtClean="0"/>
-              <a:t>9/14/2020</a:t>
+              <a:t>9/22/2020</a:t>
             </a:fld>
             <a:endParaRPr lang="en-US"/>
           </a:p>
@@ -645,7 +645,7 @@
           <a:p>
             <a:fld id="{E85117BD-C86A-4D3E-8433-2BCBAA5D5AFD}" type="datetimeFigureOut">
               <a:rPr lang="en-US" smtClean="0"/>
-              <a:t>9/14/2020</a:t>
+              <a:t>9/22/2020</a:t>
             </a:fld>
             <a:endParaRPr lang="en-US"/>
           </a:p>
@@ -1046,7 +1046,7 @@
           <a:p>
             <a:fld id="{E85117BD-C86A-4D3E-8433-2BCBAA5D5AFD}" type="datetimeFigureOut">
               <a:rPr lang="en-US" smtClean="0"/>
-              <a:t>9/14/2020</a:t>
+              <a:t>9/22/2020</a:t>
             </a:fld>
             <a:endParaRPr lang="en-US"/>
           </a:p>
@@ -1382,7 +1382,7 @@
           <a:p>
             <a:fld id="{E85117BD-C86A-4D3E-8433-2BCBAA5D5AFD}" type="datetimeFigureOut">
               <a:rPr lang="en-US" smtClean="0"/>
-              <a:t>9/14/2020</a:t>
+              <a:t>9/22/2020</a:t>
             </a:fld>
             <a:endParaRPr lang="en-US"/>
           </a:p>
@@ -1702,7 +1702,7 @@
           <a:p>
             <a:fld id="{E85117BD-C86A-4D3E-8433-2BCBAA5D5AFD}" type="datetimeFigureOut">
               <a:rPr lang="en-US" smtClean="0"/>
-              <a:t>9/14/2020</a:t>
+              <a:t>9/22/2020</a:t>
             </a:fld>
             <a:endParaRPr lang="en-US"/>
           </a:p>
@@ -2098,7 +2098,7 @@
           <a:p>
             <a:fld id="{E85117BD-C86A-4D3E-8433-2BCBAA5D5AFD}" type="datetimeFigureOut">
               <a:rPr lang="en-US" smtClean="0"/>
-              <a:t>9/14/2020</a:t>
+              <a:t>9/22/2020</a:t>
             </a:fld>
             <a:endParaRPr lang="en-US"/>
           </a:p>
@@ -2355,7 +2355,7 @@
           <a:p>
             <a:fld id="{E85117BD-C86A-4D3E-8433-2BCBAA5D5AFD}" type="datetimeFigureOut">
               <a:rPr lang="en-US" smtClean="0"/>
-              <a:t>9/14/2020</a:t>
+              <a:t>9/22/2020</a:t>
             </a:fld>
             <a:endParaRPr lang="en-US"/>
           </a:p>
@@ -2617,7 +2617,7 @@
           <a:p>
             <a:fld id="{E85117BD-C86A-4D3E-8433-2BCBAA5D5AFD}" type="datetimeFigureOut">
               <a:rPr lang="en-US" smtClean="0"/>
-              <a:t>9/14/2020</a:t>
+              <a:t>9/22/2020</a:t>
             </a:fld>
             <a:endParaRPr lang="en-US"/>
           </a:p>
@@ -2879,7 +2879,7 @@
           <a:p>
             <a:fld id="{E85117BD-C86A-4D3E-8433-2BCBAA5D5AFD}" type="datetimeFigureOut">
               <a:rPr lang="en-US" smtClean="0"/>
-              <a:t>9/14/2020</a:t>
+              <a:t>9/22/2020</a:t>
             </a:fld>
             <a:endParaRPr lang="en-US"/>
           </a:p>
@@ -3208,7 +3208,7 @@
           <a:p>
             <a:fld id="{E85117BD-C86A-4D3E-8433-2BCBAA5D5AFD}" type="datetimeFigureOut">
               <a:rPr lang="en-US" smtClean="0"/>
-              <a:t>9/14/2020</a:t>
+              <a:t>9/22/2020</a:t>
             </a:fld>
             <a:endParaRPr lang="en-US"/>
           </a:p>
@@ -3531,7 +3531,7 @@
           <a:p>
             <a:fld id="{E85117BD-C86A-4D3E-8433-2BCBAA5D5AFD}" type="datetimeFigureOut">
               <a:rPr lang="en-US" smtClean="0"/>
-              <a:t>9/14/2020</a:t>
+              <a:t>9/22/2020</a:t>
             </a:fld>
             <a:endParaRPr lang="en-US"/>
           </a:p>
@@ -3988,7 +3988,7 @@
           <a:p>
             <a:fld id="{E85117BD-C86A-4D3E-8433-2BCBAA5D5AFD}" type="datetimeFigureOut">
               <a:rPr lang="en-US" smtClean="0"/>
-              <a:t>9/14/2020</a:t>
+              <a:t>9/22/2020</a:t>
             </a:fld>
             <a:endParaRPr lang="en-US"/>
           </a:p>
@@ -4193,7 +4193,7 @@
           <a:p>
             <a:fld id="{E85117BD-C86A-4D3E-8433-2BCBAA5D5AFD}" type="datetimeFigureOut">
               <a:rPr lang="en-US" smtClean="0"/>
-              <a:t>9/14/2020</a:t>
+              <a:t>9/22/2020</a:t>
             </a:fld>
             <a:endParaRPr lang="en-US"/>
           </a:p>
@@ -4370,7 +4370,7 @@
           <a:p>
             <a:fld id="{E85117BD-C86A-4D3E-8433-2BCBAA5D5AFD}" type="datetimeFigureOut">
               <a:rPr lang="en-US" smtClean="0"/>
-              <a:t>9/14/2020</a:t>
+              <a:t>9/22/2020</a:t>
             </a:fld>
             <a:endParaRPr lang="en-US"/>
           </a:p>
@@ -4703,7 +4703,7 @@
           <a:p>
             <a:fld id="{E85117BD-C86A-4D3E-8433-2BCBAA5D5AFD}" type="datetimeFigureOut">
               <a:rPr lang="en-US" smtClean="0"/>
-              <a:t>9/14/2020</a:t>
+              <a:t>9/22/2020</a:t>
             </a:fld>
             <a:endParaRPr lang="en-US"/>
           </a:p>
@@ -5048,7 +5048,7 @@
           <a:p>
             <a:fld id="{E85117BD-C86A-4D3E-8433-2BCBAA5D5AFD}" type="datetimeFigureOut">
               <a:rPr lang="en-US" smtClean="0"/>
-              <a:t>9/14/2020</a:t>
+              <a:t>9/22/2020</a:t>
             </a:fld>
             <a:endParaRPr lang="en-US"/>
           </a:p>
@@ -7165,7 +7165,7 @@
           <a:p>
             <a:fld id="{E85117BD-C86A-4D3E-8433-2BCBAA5D5AFD}" type="datetimeFigureOut">
               <a:rPr lang="en-US" smtClean="0"/>
-              <a:t>9/14/2020</a:t>
+              <a:t>9/22/2020</a:t>
             </a:fld>
             <a:endParaRPr lang="en-US"/>
           </a:p>
@@ -7712,10 +7712,50 @@
           <a:lstStyle/>
           <a:p>
             <a:r>
-              <a:rPr lang="bg-BG" sz="4800" dirty="0"/>
+              <a:rPr lang="bg-BG" sz="3200" dirty="0"/>
               <a:t>Нека поговорим за музика</a:t>
             </a:r>
-            <a:endParaRPr lang="en-US" sz="4800" dirty="0"/>
+            <a:endParaRPr lang="en-US" sz="3200" dirty="0"/>
+          </a:p>
+        </p:txBody>
+      </p:sp>
+      <p:sp>
+        <p:nvSpPr>
+          <p:cNvPr id="4" name="TextBox 3">
+            <a:extLst>
+              <a:ext uri="{FF2B5EF4-FFF2-40B4-BE49-F238E27FC236}">
+                <a16:creationId xmlns:a16="http://schemas.microsoft.com/office/drawing/2014/main" id="{35DB5690-905B-47B7-A7B2-5864F7187977}"/>
+              </a:ext>
+            </a:extLst>
+          </p:cNvPr>
+          <p:cNvSpPr txBox="1"/>
+          <p:nvPr/>
+        </p:nvSpPr>
+        <p:spPr>
+          <a:xfrm>
+            <a:off x="2694976" y="2046299"/>
+            <a:ext cx="9067800" cy="646331"/>
+          </a:xfrm>
+          <a:prstGeom prst="rect">
+            <a:avLst/>
+          </a:prstGeom>
+          <a:noFill/>
+        </p:spPr>
+        <p:txBody>
+          <a:bodyPr wrap="square">
+            <a:spAutoFit/>
+          </a:bodyPr>
+          <a:lstStyle/>
+          <a:p>
+            <a:r>
+              <a:rPr lang="ru-RU" sz="3600" b="1" dirty="0"/>
+              <a:t>Приложение за обучение по </a:t>
+            </a:r>
+            <a:r>
+              <a:rPr lang="ru-RU" sz="3600" b="1" dirty="0" err="1"/>
+              <a:t>музика</a:t>
+            </a:r>
+            <a:endParaRPr lang="ru-RU" sz="3600" b="1" dirty="0"/>
           </a:p>
         </p:txBody>
       </p:sp>

</xml_diff>